<commit_message>
added dialogs to L2.3 and 2.4
</commit_message>
<xml_diff>
--- a/Slides/Lesson 2.3 The Interaction Scale.pptx
+++ b/Slides/Lesson 2.3 The Interaction Scale.pptx
@@ -5,7 +5,7 @@
     <p:sldMasterId id="2147483648" r:id="rId1"/>
   </p:sldMasterIdLst>
   <p:notesMasterIdLst>
-    <p:notesMasterId r:id="rId30"/>
+    <p:notesMasterId r:id="rId35"/>
   </p:notesMasterIdLst>
   <p:sldIdLst>
     <p:sldId id="485" r:id="rId2"/>
@@ -35,36 +35,41 @@
     <p:sldId id="456" r:id="rId26"/>
     <p:sldId id="471" r:id="rId27"/>
     <p:sldId id="472" r:id="rId28"/>
-    <p:sldId id="487" r:id="rId29"/>
+    <p:sldId id="490" r:id="rId29"/>
+    <p:sldId id="491" r:id="rId30"/>
+    <p:sldId id="492" r:id="rId31"/>
+    <p:sldId id="493" r:id="rId32"/>
+    <p:sldId id="494" r:id="rId33"/>
+    <p:sldId id="487" r:id="rId34"/>
   </p:sldIdLst>
   <p:sldSz cx="12192000" cy="6858000"/>
   <p:notesSz cx="6858000" cy="9144000"/>
   <p:embeddedFontLst>
     <p:embeddedFont>
       <p:font typeface="Calibri" panose="020F0502020204030204" pitchFamily="34" charset="0"/>
-      <p:regular r:id="rId31"/>
-      <p:bold r:id="rId32"/>
-      <p:italic r:id="rId33"/>
-      <p:boldItalic r:id="rId34"/>
+      <p:regular r:id="rId36"/>
+      <p:bold r:id="rId37"/>
+      <p:italic r:id="rId38"/>
+      <p:boldItalic r:id="rId39"/>
     </p:embeddedFont>
     <p:embeddedFont>
       <p:font typeface="Consolas" panose="020B0609020204030204" pitchFamily="49" charset="0"/>
-      <p:regular r:id="rId35"/>
-      <p:bold r:id="rId36"/>
-      <p:italic r:id="rId37"/>
-      <p:boldItalic r:id="rId38"/>
+      <p:regular r:id="rId40"/>
+      <p:bold r:id="rId41"/>
+      <p:italic r:id="rId42"/>
+      <p:boldItalic r:id="rId43"/>
     </p:embeddedFont>
     <p:embeddedFont>
       <p:font typeface="Open Sans ExtraBold" panose="020B0906030804020204" pitchFamily="34" charset="0"/>
-      <p:bold r:id="rId39"/>
-      <p:boldItalic r:id="rId40"/>
+      <p:bold r:id="rId44"/>
+      <p:boldItalic r:id="rId45"/>
     </p:embeddedFont>
     <p:embeddedFont>
       <p:font typeface="Verdana" panose="020B0604030504040204" pitchFamily="34" charset="0"/>
-      <p:regular r:id="rId41"/>
-      <p:bold r:id="rId42"/>
-      <p:italic r:id="rId43"/>
-      <p:boldItalic r:id="rId44"/>
+      <p:regular r:id="rId46"/>
+      <p:bold r:id="rId47"/>
+      <p:italic r:id="rId48"/>
+      <p:boldItalic r:id="rId49"/>
     </p:embeddedFont>
   </p:embeddedFontLst>
   <p:defaultTextStyle>
@@ -194,6 +199,11 @@
             <p14:sldId id="456"/>
             <p14:sldId id="471"/>
             <p14:sldId id="472"/>
+            <p14:sldId id="490"/>
+            <p14:sldId id="491"/>
+            <p14:sldId id="492"/>
+            <p14:sldId id="493"/>
+            <p14:sldId id="494"/>
             <p14:sldId id="487"/>
           </p14:sldIdLst>
         </p14:section>
@@ -288,7 +298,7 @@
           <a:p>
             <a:fld id="{7C7E5181-6CF5-45F7-A87A-E0E0B1FD7549}" type="datetimeFigureOut">
               <a:rPr lang="en-US" smtClean="0"/>
-              <a:t>1/23/2022</a:t>
+              <a:t>1/26/2022</a:t>
             </a:fld>
             <a:endParaRPr lang="en-US"/>
           </a:p>
@@ -2899,18 +2909,53 @@
           <a:p>
             <a:r>
               <a:rPr lang="en-US" dirty="0"/>
-              <a:t>We’ve covered a lot of ground in this lesson.  &lt;read slide&gt;</a:t>
+              <a:t>We said that this week's goal is to give you the vocabulary to talk</a:t>
             </a:r>
           </a:p>
           <a:p>
             <a:r>
               <a:rPr lang="en-US" dirty="0"/>
-              <a:t>Next, on to the </a:t>
-            </a:r>
-            <a:r>
-              <a:rPr lang="en-US"/>
-              <a:t>Object Scale.</a:t>
-            </a:r>
+              <a:t>about your design.  So it's really about the language(s) of software</a:t>
+            </a:r>
+          </a:p>
+          <a:p>
+            <a:r>
+              <a:rPr lang="en-US" dirty="0"/>
+              <a:t>design.</a:t>
+            </a:r>
+          </a:p>
+          <a:p>
+            <a:endParaRPr lang="en-US" dirty="0"/>
+          </a:p>
+          <a:p>
+            <a:r>
+              <a:rPr lang="en-US" dirty="0"/>
+              <a:t>Like in any language course, once you learn the words, the next thing</a:t>
+            </a:r>
+          </a:p>
+          <a:p>
+            <a:r>
+              <a:rPr lang="en-US" dirty="0"/>
+              <a:t>you do is to practice putting them into sentences.</a:t>
+            </a:r>
+          </a:p>
+          <a:p>
+            <a:endParaRPr lang="en-US" dirty="0"/>
+          </a:p>
+          <a:p>
+            <a:r>
+              <a:rPr lang="en-US" dirty="0"/>
+              <a:t>So here's a piece of a design, expressed as a sentence (ok, three</a:t>
+            </a:r>
+          </a:p>
+          <a:p>
+            <a:r>
+              <a:rPr lang="en-US" dirty="0"/>
+              <a:t>sentences)</a:t>
+            </a:r>
+          </a:p>
+          <a:p>
+            <a:endParaRPr lang="en-US" dirty="0"/>
           </a:p>
         </p:txBody>
       </p:sp>
@@ -2940,7 +2985,94 @@
     </p:spTree>
     <p:extLst>
       <p:ext uri="{BB962C8B-B14F-4D97-AF65-F5344CB8AC3E}">
-        <p14:creationId xmlns:p14="http://schemas.microsoft.com/office/powerpoint/2010/main" val="2570327503"/>
+        <p14:creationId xmlns:p14="http://schemas.microsoft.com/office/powerpoint/2010/main" val="476959786"/>
+      </p:ext>
+    </p:extLst>
+  </p:cSld>
+  <p:clrMapOvr>
+    <a:masterClrMapping/>
+  </p:clrMapOvr>
+</p:notes>
+</file>
+
+<file path=ppt/notesSlides/notesSlide29.xml><?xml version="1.0" encoding="utf-8"?>
+<p:notes xmlns:a="http://schemas.openxmlformats.org/drawingml/2006/main" xmlns:r="http://schemas.openxmlformats.org/officeDocument/2006/relationships" xmlns:p="http://schemas.openxmlformats.org/presentationml/2006/main">
+  <p:cSld>
+    <p:spTree>
+      <p:nvGrpSpPr>
+        <p:cNvPr id="1" name=""/>
+        <p:cNvGrpSpPr/>
+        <p:nvPr/>
+      </p:nvGrpSpPr>
+      <p:grpSpPr>
+        <a:xfrm>
+          <a:off x="0" y="0"/>
+          <a:ext cx="0" cy="0"/>
+          <a:chOff x="0" y="0"/>
+          <a:chExt cx="0" cy="0"/>
+        </a:xfrm>
+      </p:grpSpPr>
+      <p:sp>
+        <p:nvSpPr>
+          <p:cNvPr id="2" name="Slide Image Placeholder 1"/>
+          <p:cNvSpPr>
+            <a:spLocks noGrp="1" noRot="1" noChangeAspect="1"/>
+          </p:cNvSpPr>
+          <p:nvPr>
+            <p:ph type="sldImg"/>
+          </p:nvPr>
+        </p:nvSpPr>
+        <p:spPr/>
+      </p:sp>
+      <p:sp>
+        <p:nvSpPr>
+          <p:cNvPr id="3" name="Notes Placeholder 2"/>
+          <p:cNvSpPr>
+            <a:spLocks noGrp="1"/>
+          </p:cNvSpPr>
+          <p:nvPr>
+            <p:ph type="body" idx="1"/>
+          </p:nvPr>
+        </p:nvSpPr>
+        <p:spPr/>
+        <p:txBody>
+          <a:bodyPr/>
+          <a:lstStyle/>
+          <a:p>
+            <a:r>
+              <a:rPr lang="en-US" dirty="0"/>
+              <a:t>Here’s a possible conversation in this new language.   Note that you had to have an agreement with Pat about the protocol for the clock.</a:t>
+            </a:r>
+          </a:p>
+        </p:txBody>
+      </p:sp>
+      <p:sp>
+        <p:nvSpPr>
+          <p:cNvPr id="4" name="Slide Number Placeholder 3"/>
+          <p:cNvSpPr>
+            <a:spLocks noGrp="1"/>
+          </p:cNvSpPr>
+          <p:nvPr>
+            <p:ph type="sldNum" sz="quarter" idx="5"/>
+          </p:nvPr>
+        </p:nvSpPr>
+        <p:spPr/>
+        <p:txBody>
+          <a:bodyPr/>
+          <a:lstStyle/>
+          <a:p>
+            <a:fld id="{07937F07-1250-4CCE-B198-1B2887014F41}" type="slidenum">
+              <a:rPr lang="en-US" smtClean="0"/>
+              <a:t>29</a:t>
+            </a:fld>
+            <a:endParaRPr lang="en-US"/>
+          </a:p>
+        </p:txBody>
+      </p:sp>
+    </p:spTree>
+    <p:extLst>
+      <p:ext uri="{BB962C8B-B14F-4D97-AF65-F5344CB8AC3E}">
+        <p14:creationId xmlns:p14="http://schemas.microsoft.com/office/powerpoint/2010/main" val="2550609105"/>
       </p:ext>
     </p:extLst>
   </p:cSld>
@@ -3046,6 +3178,293 @@
     <p:extLst>
       <p:ext uri="{BB962C8B-B14F-4D97-AF65-F5344CB8AC3E}">
         <p14:creationId xmlns:p14="http://schemas.microsoft.com/office/powerpoint/2010/main" val="3924315404"/>
+      </p:ext>
+    </p:extLst>
+  </p:cSld>
+  <p:clrMapOvr>
+    <a:masterClrMapping/>
+  </p:clrMapOvr>
+</p:notes>
+</file>
+
+<file path=ppt/notesSlides/notesSlide30.xml><?xml version="1.0" encoding="utf-8"?>
+<p:notes xmlns:a="http://schemas.openxmlformats.org/drawingml/2006/main" xmlns:r="http://schemas.openxmlformats.org/officeDocument/2006/relationships" xmlns:p="http://schemas.openxmlformats.org/presentationml/2006/main">
+  <p:cSld>
+    <p:spTree>
+      <p:nvGrpSpPr>
+        <p:cNvPr id="1" name=""/>
+        <p:cNvGrpSpPr/>
+        <p:nvPr/>
+      </p:nvGrpSpPr>
+      <p:grpSpPr>
+        <a:xfrm>
+          <a:off x="0" y="0"/>
+          <a:ext cx="0" cy="0"/>
+          <a:chOff x="0" y="0"/>
+          <a:chExt cx="0" cy="0"/>
+        </a:xfrm>
+      </p:grpSpPr>
+      <p:sp>
+        <p:nvSpPr>
+          <p:cNvPr id="2" name="Slide Image Placeholder 1"/>
+          <p:cNvSpPr>
+            <a:spLocks noGrp="1" noRot="1" noChangeAspect="1"/>
+          </p:cNvSpPr>
+          <p:nvPr>
+            <p:ph type="sldImg"/>
+          </p:nvPr>
+        </p:nvSpPr>
+        <p:spPr/>
+      </p:sp>
+      <p:sp>
+        <p:nvSpPr>
+          <p:cNvPr id="3" name="Notes Placeholder 2"/>
+          <p:cNvSpPr>
+            <a:spLocks noGrp="1"/>
+          </p:cNvSpPr>
+          <p:nvPr>
+            <p:ph type="body" idx="1"/>
+          </p:nvPr>
+        </p:nvSpPr>
+        <p:spPr/>
+        <p:txBody>
+          <a:bodyPr/>
+          <a:lstStyle/>
+          <a:p>
+            <a:endParaRPr lang="en-US" dirty="0"/>
+          </a:p>
+        </p:txBody>
+      </p:sp>
+      <p:sp>
+        <p:nvSpPr>
+          <p:cNvPr id="4" name="Slide Number Placeholder 3"/>
+          <p:cNvSpPr>
+            <a:spLocks noGrp="1"/>
+          </p:cNvSpPr>
+          <p:nvPr>
+            <p:ph type="sldNum" sz="quarter" idx="5"/>
+          </p:nvPr>
+        </p:nvSpPr>
+        <p:spPr/>
+        <p:txBody>
+          <a:bodyPr/>
+          <a:lstStyle/>
+          <a:p>
+            <a:fld id="{07937F07-1250-4CCE-B198-1B2887014F41}" type="slidenum">
+              <a:rPr lang="en-US" smtClean="0"/>
+              <a:t>30</a:t>
+            </a:fld>
+            <a:endParaRPr lang="en-US"/>
+          </a:p>
+        </p:txBody>
+      </p:sp>
+    </p:spTree>
+    <p:extLst>
+      <p:ext uri="{BB962C8B-B14F-4D97-AF65-F5344CB8AC3E}">
+        <p14:creationId xmlns:p14="http://schemas.microsoft.com/office/powerpoint/2010/main" val="2222246358"/>
+      </p:ext>
+    </p:extLst>
+  </p:cSld>
+  <p:clrMapOvr>
+    <a:masterClrMapping/>
+  </p:clrMapOvr>
+</p:notes>
+</file>
+
+<file path=ppt/notesSlides/notesSlide31.xml><?xml version="1.0" encoding="utf-8"?>
+<p:notes xmlns:a="http://schemas.openxmlformats.org/drawingml/2006/main" xmlns:r="http://schemas.openxmlformats.org/officeDocument/2006/relationships" xmlns:p="http://schemas.openxmlformats.org/presentationml/2006/main">
+  <p:cSld>
+    <p:spTree>
+      <p:nvGrpSpPr>
+        <p:cNvPr id="1" name=""/>
+        <p:cNvGrpSpPr/>
+        <p:nvPr/>
+      </p:nvGrpSpPr>
+      <p:grpSpPr>
+        <a:xfrm>
+          <a:off x="0" y="0"/>
+          <a:ext cx="0" cy="0"/>
+          <a:chOff x="0" y="0"/>
+          <a:chExt cx="0" cy="0"/>
+        </a:xfrm>
+      </p:grpSpPr>
+      <p:sp>
+        <p:nvSpPr>
+          <p:cNvPr id="2" name="Slide Image Placeholder 1"/>
+          <p:cNvSpPr>
+            <a:spLocks noGrp="1" noRot="1" noChangeAspect="1"/>
+          </p:cNvSpPr>
+          <p:nvPr>
+            <p:ph type="sldImg"/>
+          </p:nvPr>
+        </p:nvSpPr>
+        <p:spPr/>
+      </p:sp>
+      <p:sp>
+        <p:nvSpPr>
+          <p:cNvPr id="3" name="Notes Placeholder 2"/>
+          <p:cNvSpPr>
+            <a:spLocks noGrp="1"/>
+          </p:cNvSpPr>
+          <p:nvPr>
+            <p:ph type="body" idx="1"/>
+          </p:nvPr>
+        </p:nvSpPr>
+        <p:spPr/>
+        <p:txBody>
+          <a:bodyPr/>
+          <a:lstStyle/>
+          <a:p>
+            <a:r>
+              <a:rPr lang="en-US" dirty="0"/>
+              <a:t>You now have a rich vocabulary that you can use to discuss your design.</a:t>
+            </a:r>
+          </a:p>
+        </p:txBody>
+      </p:sp>
+      <p:sp>
+        <p:nvSpPr>
+          <p:cNvPr id="4" name="Slide Number Placeholder 3"/>
+          <p:cNvSpPr>
+            <a:spLocks noGrp="1"/>
+          </p:cNvSpPr>
+          <p:nvPr>
+            <p:ph type="sldNum" sz="quarter" idx="5"/>
+          </p:nvPr>
+        </p:nvSpPr>
+        <p:spPr/>
+        <p:txBody>
+          <a:bodyPr/>
+          <a:lstStyle/>
+          <a:p>
+            <a:fld id="{07937F07-1250-4CCE-B198-1B2887014F41}" type="slidenum">
+              <a:rPr lang="en-US" smtClean="0"/>
+              <a:t>32</a:t>
+            </a:fld>
+            <a:endParaRPr lang="en-US"/>
+          </a:p>
+        </p:txBody>
+      </p:sp>
+    </p:spTree>
+    <p:extLst>
+      <p:ext uri="{BB962C8B-B14F-4D97-AF65-F5344CB8AC3E}">
+        <p14:creationId xmlns:p14="http://schemas.microsoft.com/office/powerpoint/2010/main" val="693301086"/>
+      </p:ext>
+    </p:extLst>
+  </p:cSld>
+  <p:clrMapOvr>
+    <a:masterClrMapping/>
+  </p:clrMapOvr>
+</p:notes>
+</file>
+
+<file path=ppt/notesSlides/notesSlide32.xml><?xml version="1.0" encoding="utf-8"?>
+<p:notes xmlns:a="http://schemas.openxmlformats.org/drawingml/2006/main" xmlns:r="http://schemas.openxmlformats.org/officeDocument/2006/relationships" xmlns:p="http://schemas.openxmlformats.org/presentationml/2006/main">
+  <p:cSld>
+    <p:spTree>
+      <p:nvGrpSpPr>
+        <p:cNvPr id="1" name=""/>
+        <p:cNvGrpSpPr/>
+        <p:nvPr/>
+      </p:nvGrpSpPr>
+      <p:grpSpPr>
+        <a:xfrm>
+          <a:off x="0" y="0"/>
+          <a:ext cx="0" cy="0"/>
+          <a:chOff x="0" y="0"/>
+          <a:chExt cx="0" cy="0"/>
+        </a:xfrm>
+      </p:grpSpPr>
+      <p:sp>
+        <p:nvSpPr>
+          <p:cNvPr id="2" name="Slide Image Placeholder 1"/>
+          <p:cNvSpPr>
+            <a:spLocks noGrp="1" noRot="1" noChangeAspect="1"/>
+          </p:cNvSpPr>
+          <p:nvPr>
+            <p:ph type="sldImg"/>
+          </p:nvPr>
+        </p:nvSpPr>
+        <p:spPr/>
+      </p:sp>
+      <p:sp>
+        <p:nvSpPr>
+          <p:cNvPr id="3" name="Notes Placeholder 2"/>
+          <p:cNvSpPr>
+            <a:spLocks noGrp="1"/>
+          </p:cNvSpPr>
+          <p:nvPr>
+            <p:ph type="body" idx="1"/>
+          </p:nvPr>
+        </p:nvSpPr>
+        <p:spPr/>
+        <p:txBody>
+          <a:bodyPr/>
+          <a:lstStyle/>
+          <a:p>
+            <a:r>
+              <a:rPr lang="en-US" dirty="0"/>
+              <a:t>We’ve covered a lot of ground in this lesson.  &lt;read slide&gt;</a:t>
+            </a:r>
+          </a:p>
+          <a:p>
+            <a:r>
+              <a:rPr lang="en-US" dirty="0"/>
+              <a:t>Next, on to the Object Scale.</a:t>
+            </a:r>
+          </a:p>
+          <a:p>
+            <a:endParaRPr lang="en-US" dirty="0"/>
+          </a:p>
+          <a:p>
+            <a:r>
+              <a:rPr lang="en-US" dirty="0"/>
+              <a:t>[[POSSIBLE ACTIVITY: Break </a:t>
+            </a:r>
+            <a:r>
+              <a:rPr lang="en-US"/>
+              <a:t>into pairs, </a:t>
+            </a:r>
+            <a:r>
+              <a:rPr lang="en-US" dirty="0"/>
+              <a:t>and describe the interactions</a:t>
+            </a:r>
+          </a:p>
+          <a:p>
+            <a:r>
+              <a:rPr lang="en-US" dirty="0"/>
+              <a:t>in some program you have built, at this level of detail.]]</a:t>
+            </a:r>
+          </a:p>
+        </p:txBody>
+      </p:sp>
+      <p:sp>
+        <p:nvSpPr>
+          <p:cNvPr id="4" name="Slide Number Placeholder 3"/>
+          <p:cNvSpPr>
+            <a:spLocks noGrp="1"/>
+          </p:cNvSpPr>
+          <p:nvPr>
+            <p:ph type="sldNum" sz="quarter" idx="5"/>
+          </p:nvPr>
+        </p:nvSpPr>
+        <p:spPr/>
+        <p:txBody>
+          <a:bodyPr/>
+          <a:lstStyle/>
+          <a:p>
+            <a:fld id="{07937F07-1250-4CCE-B198-1B2887014F41}" type="slidenum">
+              <a:rPr lang="en-US" smtClean="0"/>
+              <a:t>33</a:t>
+            </a:fld>
+            <a:endParaRPr lang="en-US"/>
+          </a:p>
+        </p:txBody>
+      </p:sp>
+    </p:spTree>
+    <p:extLst>
+      <p:ext uri="{BB962C8B-B14F-4D97-AF65-F5344CB8AC3E}">
+        <p14:creationId xmlns:p14="http://schemas.microsoft.com/office/powerpoint/2010/main" val="2570327503"/>
       </p:ext>
     </p:extLst>
   </p:cSld>
@@ -3976,7 +4395,7 @@
           <a:p>
             <a:fld id="{5D2A64DE-480B-420F-9649-4F8E696E08E0}" type="datetime1">
               <a:rPr lang="en-US" smtClean="0"/>
-              <a:t>1/23/2022</a:t>
+              <a:t>1/26/2022</a:t>
             </a:fld>
             <a:endParaRPr lang="en-US"/>
           </a:p>
@@ -4300,7 +4719,7 @@
           <a:p>
             <a:fld id="{EA476A42-A091-4468-A075-64A31BE59948}" type="datetime1">
               <a:rPr lang="en-US" smtClean="0"/>
-              <a:t>1/23/2022</a:t>
+              <a:t>1/26/2022</a:t>
             </a:fld>
             <a:endParaRPr lang="en-US"/>
           </a:p>
@@ -4498,7 +4917,7 @@
           <a:p>
             <a:fld id="{0D3616D0-8311-4107-9726-6B805E7D05BA}" type="datetime1">
               <a:rPr lang="en-US" smtClean="0"/>
-              <a:t>1/23/2022</a:t>
+              <a:t>1/26/2022</a:t>
             </a:fld>
             <a:endParaRPr lang="en-US"/>
           </a:p>
@@ -4706,7 +5125,7 @@
           <a:p>
             <a:fld id="{3BC2557A-5C88-417A-A763-5AC779462A5F}" type="datetime1">
               <a:rPr lang="en-US" smtClean="0"/>
-              <a:t>1/23/2022</a:t>
+              <a:t>1/26/2022</a:t>
             </a:fld>
             <a:endParaRPr lang="en-US"/>
           </a:p>
@@ -5230,7 +5649,7 @@
           <a:p>
             <a:fld id="{07C7BFD4-467E-4EDE-93EA-052F5B39A4E5}" type="datetime1">
               <a:rPr lang="en-US" smtClean="0"/>
-              <a:t>1/23/2022</a:t>
+              <a:t>1/26/2022</a:t>
             </a:fld>
             <a:endParaRPr lang="en-US"/>
           </a:p>
@@ -5480,7 +5899,7 @@
           <a:p>
             <a:fld id="{07C7BFD4-467E-4EDE-93EA-052F5B39A4E5}" type="datetime1">
               <a:rPr lang="en-US" smtClean="0"/>
-              <a:t>1/23/2022</a:t>
+              <a:t>1/26/2022</a:t>
             </a:fld>
             <a:endParaRPr lang="en-US"/>
           </a:p>
@@ -5662,7 +6081,7 @@
           <a:p>
             <a:fld id="{109E55A0-C911-4F03-82FC-7E5926047D46}" type="datetime1">
               <a:rPr lang="en-US" smtClean="0"/>
-              <a:t>1/23/2022</a:t>
+              <a:t>1/26/2022</a:t>
             </a:fld>
             <a:endParaRPr lang="en-US"/>
           </a:p>
@@ -5975,7 +6394,7 @@
           <a:p>
             <a:fld id="{A533CBE2-D5BE-47AC-ADC2-9CDFC1D0CF90}" type="datetime1">
               <a:rPr lang="en-US" smtClean="0"/>
-              <a:t>1/23/2022</a:t>
+              <a:t>1/26/2022</a:t>
             </a:fld>
             <a:endParaRPr lang="en-US"/>
           </a:p>
@@ -6276,7 +6695,7 @@
           <a:p>
             <a:fld id="{39B7EDB1-CE74-4951-85A2-0B01C2128E28}" type="datetime1">
               <a:rPr lang="en-US" smtClean="0"/>
-              <a:t>1/23/2022</a:t>
+              <a:t>1/26/2022</a:t>
             </a:fld>
             <a:endParaRPr lang="en-US"/>
           </a:p>
@@ -6724,7 +7143,7 @@
           <a:p>
             <a:fld id="{2BC7EB92-A5C2-4807-A9DC-9EDE6CBFB241}" type="datetime1">
               <a:rPr lang="en-US" smtClean="0"/>
-              <a:t>1/23/2022</a:t>
+              <a:t>1/26/2022</a:t>
             </a:fld>
             <a:endParaRPr lang="en-US"/>
           </a:p>
@@ -6837,7 +7256,7 @@
           <a:p>
             <a:fld id="{2B7B7EE0-7771-4CD5-9B2B-3550753A54A1}" type="datetime1">
               <a:rPr lang="en-US" smtClean="0"/>
-              <a:t>1/23/2022</a:t>
+              <a:t>1/26/2022</a:t>
             </a:fld>
             <a:endParaRPr lang="en-US"/>
           </a:p>
@@ -7148,7 +7567,7 @@
           <a:p>
             <a:fld id="{F8B318B3-0E87-4416-A9B8-D891968C2727}" type="datetime1">
               <a:rPr lang="en-US" smtClean="0"/>
-              <a:t>1/23/2022</a:t>
+              <a:t>1/26/2022</a:t>
             </a:fld>
             <a:endParaRPr lang="en-US"/>
           </a:p>
@@ -7389,7 +7808,7 @@
           <a:p>
             <a:fld id="{54D997E8-DDEE-43F1-8D9B-F8A1E11DE488}" type="datetime1">
               <a:rPr lang="en-US" smtClean="0"/>
-              <a:t>1/23/2022</a:t>
+              <a:t>1/26/2022</a:t>
             </a:fld>
             <a:endParaRPr lang="en-US"/>
           </a:p>
@@ -26580,7 +26999,7 @@
           <p:cNvPr id="2" name="Title 1">
             <a:extLst>
               <a:ext uri="{FF2B5EF4-FFF2-40B4-BE49-F238E27FC236}">
-                <a16:creationId xmlns:a16="http://schemas.microsoft.com/office/drawing/2014/main" id="{E743D407-5B53-49A7-9907-E801EA7FFD8E}"/>
+                <a16:creationId xmlns:a16="http://schemas.microsoft.com/office/drawing/2014/main" id="{B1A3C0D0-0D5D-4D8C-9D3A-06E2CE84B911}"/>
               </a:ext>
             </a:extLst>
           </p:cNvPr>
@@ -26598,17 +27017,17 @@
           <a:p>
             <a:r>
               <a:rPr lang="en-US" dirty="0"/>
-              <a:t>Learning Goals for this Lesson</a:t>
+              <a:t>Describing your design using these vocabulary words</a:t>
             </a:r>
           </a:p>
         </p:txBody>
       </p:sp>
       <p:sp>
         <p:nvSpPr>
-          <p:cNvPr id="3" name="Content Placeholder 2">
+          <p:cNvPr id="5" name="Content Placeholder 4">
             <a:extLst>
               <a:ext uri="{FF2B5EF4-FFF2-40B4-BE49-F238E27FC236}">
-                <a16:creationId xmlns:a16="http://schemas.microsoft.com/office/drawing/2014/main" id="{AC300E2B-BFD0-4090-AFC5-FE82683F997F}"/>
+                <a16:creationId xmlns:a16="http://schemas.microsoft.com/office/drawing/2014/main" id="{82AB9F76-899B-4F36-B260-B26D4C555F60}"/>
               </a:ext>
             </a:extLst>
           </p:cNvPr>
@@ -26619,29 +27038,49 @@
             <p:ph idx="1"/>
           </p:nvPr>
         </p:nvSpPr>
-        <p:spPr/>
+        <p:spPr>
+          <a:xfrm>
+            <a:off x="838199" y="1500160"/>
+            <a:ext cx="9705975" cy="4351338"/>
+          </a:xfrm>
+        </p:spPr>
         <p:txBody>
-          <a:bodyPr/>
+          <a:bodyPr>
+            <a:normAutofit lnSpcReduction="10000"/>
+          </a:bodyPr>
           <a:lstStyle/>
           <a:p>
-            <a:r>
-              <a:rPr lang="en-US" dirty="0"/>
-              <a:t>At this point, you should be able to</a:t>
-            </a:r>
-          </a:p>
-          <a:p>
-            <a:pPr lvl="1"/>
-            <a:r>
-              <a:rPr lang="en-US" dirty="0"/>
-              <a:t>Give 4 examples of interaction patterns and describe their distinguishing characteristics</a:t>
-            </a:r>
-          </a:p>
-          <a:p>
-            <a:pPr lvl="1"/>
-            <a:r>
-              <a:rPr lang="en-US" dirty="0"/>
-              <a:t>Draw a picture or give an example to illustrate each one</a:t>
-            </a:r>
+            <a:pPr marL="0" indent="0">
+              <a:buNone/>
+            </a:pPr>
+            <a:r>
+              <a:rPr lang="en-US" sz="3600" dirty="0"/>
+              <a:t>When I create an object that needs a clock, I get a copy of the master clock from the clock factory, and then I have the new object register itself with the clock.  </a:t>
+            </a:r>
+          </a:p>
+          <a:p>
+            <a:pPr marL="0" indent="0">
+              <a:buNone/>
+            </a:pPr>
+            <a:r>
+              <a:rPr lang="en-US" sz="3600" dirty="0"/>
+              <a:t>The master clock updates my object whenever the master clock changes.  </a:t>
+            </a:r>
+          </a:p>
+          <a:p>
+            <a:pPr marL="0" indent="0">
+              <a:buNone/>
+            </a:pPr>
+            <a:r>
+              <a:rPr lang="en-US" sz="3600" dirty="0"/>
+              <a:t>It also sends my object an update message when it registers, so my object will always have the latest time.</a:t>
+            </a:r>
+          </a:p>
+          <a:p>
+            <a:pPr marL="0" indent="0">
+              <a:buNone/>
+            </a:pPr>
+            <a:endParaRPr lang="en-US" dirty="0"/>
           </a:p>
         </p:txBody>
       </p:sp>
@@ -26650,7 +27089,7 @@
           <p:cNvPr id="4" name="Slide Number Placeholder 3">
             <a:extLst>
               <a:ext uri="{FF2B5EF4-FFF2-40B4-BE49-F238E27FC236}">
-                <a16:creationId xmlns:a16="http://schemas.microsoft.com/office/drawing/2014/main" id="{B7BF3F82-6F96-41E0-9C15-23CE00076176}"/>
+                <a16:creationId xmlns:a16="http://schemas.microsoft.com/office/drawing/2014/main" id="{82893DF6-F040-4CC4-BAA5-75D4631AE021}"/>
               </a:ext>
             </a:extLst>
           </p:cNvPr>
@@ -26677,7 +27116,227 @@
     </p:spTree>
     <p:extLst>
       <p:ext uri="{BB962C8B-B14F-4D97-AF65-F5344CB8AC3E}">
-        <p14:creationId xmlns:p14="http://schemas.microsoft.com/office/powerpoint/2010/main" val="3988182231"/>
+        <p14:creationId xmlns:p14="http://schemas.microsoft.com/office/powerpoint/2010/main" val="403352295"/>
+      </p:ext>
+    </p:extLst>
+  </p:cSld>
+  <p:clrMapOvr>
+    <a:masterClrMapping/>
+  </p:clrMapOvr>
+</p:sld>
+</file>
+
+<file path=ppt/slides/slide29.xml><?xml version="1.0" encoding="utf-8"?>
+<p:sld xmlns:a="http://schemas.openxmlformats.org/drawingml/2006/main" xmlns:r="http://schemas.openxmlformats.org/officeDocument/2006/relationships" xmlns:p="http://schemas.openxmlformats.org/presentationml/2006/main">
+  <p:cSld>
+    <p:spTree>
+      <p:nvGrpSpPr>
+        <p:cNvPr id="1" name=""/>
+        <p:cNvGrpSpPr/>
+        <p:nvPr/>
+      </p:nvGrpSpPr>
+      <p:grpSpPr>
+        <a:xfrm>
+          <a:off x="0" y="0"/>
+          <a:ext cx="0" cy="0"/>
+          <a:chOff x="0" y="0"/>
+          <a:chExt cx="0" cy="0"/>
+        </a:xfrm>
+      </p:grpSpPr>
+      <p:sp>
+        <p:nvSpPr>
+          <p:cNvPr id="5" name="Title 4">
+            <a:extLst>
+              <a:ext uri="{FF2B5EF4-FFF2-40B4-BE49-F238E27FC236}">
+                <a16:creationId xmlns:a16="http://schemas.microsoft.com/office/drawing/2014/main" id="{273410E1-E6C4-4D22-A7F9-8EF1CE45AA03}"/>
+              </a:ext>
+            </a:extLst>
+          </p:cNvPr>
+          <p:cNvSpPr>
+            <a:spLocks noGrp="1"/>
+          </p:cNvSpPr>
+          <p:nvPr>
+            <p:ph type="title"/>
+          </p:nvPr>
+        </p:nvSpPr>
+        <p:spPr/>
+        <p:txBody>
+          <a:bodyPr/>
+          <a:lstStyle/>
+          <a:p>
+            <a:r>
+              <a:rPr lang="en-US" dirty="0"/>
+              <a:t>Discussing your design </a:t>
+            </a:r>
+          </a:p>
+        </p:txBody>
+      </p:sp>
+      <p:sp>
+        <p:nvSpPr>
+          <p:cNvPr id="4" name="Slide Number Placeholder 3">
+            <a:extLst>
+              <a:ext uri="{FF2B5EF4-FFF2-40B4-BE49-F238E27FC236}">
+                <a16:creationId xmlns:a16="http://schemas.microsoft.com/office/drawing/2014/main" id="{8B1878C1-F603-4F39-B859-D8D906202A4A}"/>
+              </a:ext>
+            </a:extLst>
+          </p:cNvPr>
+          <p:cNvSpPr>
+            <a:spLocks noGrp="1"/>
+          </p:cNvSpPr>
+          <p:nvPr>
+            <p:ph type="sldNum" sz="quarter" idx="12"/>
+          </p:nvPr>
+        </p:nvSpPr>
+        <p:spPr/>
+        <p:txBody>
+          <a:bodyPr/>
+          <a:lstStyle/>
+          <a:p>
+            <a:fld id="{20F37917-FD3A-4669-9018-DA04BCDD3D75}" type="slidenum">
+              <a:rPr lang="en-US" smtClean="0"/>
+              <a:t>29</a:t>
+            </a:fld>
+            <a:endParaRPr lang="en-US"/>
+          </a:p>
+        </p:txBody>
+      </p:sp>
+      <p:sp>
+        <p:nvSpPr>
+          <p:cNvPr id="6" name="Speech Bubble: Rectangle with Corners Rounded 5">
+            <a:extLst>
+              <a:ext uri="{FF2B5EF4-FFF2-40B4-BE49-F238E27FC236}">
+                <a16:creationId xmlns:a16="http://schemas.microsoft.com/office/drawing/2014/main" id="{706C334E-0405-4E43-98B3-F783B6DA076D}"/>
+              </a:ext>
+            </a:extLst>
+          </p:cNvPr>
+          <p:cNvSpPr/>
+          <p:nvPr/>
+        </p:nvSpPr>
+        <p:spPr>
+          <a:xfrm>
+            <a:off x="6267450" y="1577975"/>
+            <a:ext cx="4686300" cy="5143500"/>
+          </a:xfrm>
+          <a:prstGeom prst="wedgeRoundRectCallout">
+            <a:avLst>
+              <a:gd name="adj1" fmla="val -53780"/>
+              <a:gd name="adj2" fmla="val 35237"/>
+              <a:gd name="adj3" fmla="val 16667"/>
+            </a:avLst>
+          </a:prstGeom>
+          <a:solidFill>
+            <a:schemeClr val="bg1"/>
+          </a:solidFill>
+          <a:ln>
+            <a:solidFill>
+              <a:srgbClr val="0070C0"/>
+            </a:solidFill>
+          </a:ln>
+        </p:spPr>
+        <p:style>
+          <a:lnRef idx="2">
+            <a:schemeClr val="accent1">
+              <a:shade val="50000"/>
+            </a:schemeClr>
+          </a:lnRef>
+          <a:fillRef idx="1">
+            <a:schemeClr val="accent1"/>
+          </a:fillRef>
+          <a:effectRef idx="0">
+            <a:schemeClr val="accent1"/>
+          </a:effectRef>
+          <a:fontRef idx="minor">
+            <a:schemeClr val="lt1"/>
+          </a:fontRef>
+        </p:style>
+        <p:txBody>
+          <a:bodyPr rtlCol="0" anchor="t"/>
+          <a:lstStyle/>
+          <a:p>
+            <a:pPr algn="l"/>
+            <a:r>
+              <a:rPr lang="en-US" sz="2800" dirty="0">
+                <a:solidFill>
+                  <a:schemeClr val="tx1"/>
+                </a:solidFill>
+              </a:rPr>
+              <a:t>I have a lot of objects, and they each check the time very often.  If they were constantly sending messages to the master clock, that would be a big load for it.  I sat down with Pat, who is building the master clock, and we agreed on this design.</a:t>
+            </a:r>
+          </a:p>
+        </p:txBody>
+      </p:sp>
+      <p:sp>
+        <p:nvSpPr>
+          <p:cNvPr id="7" name="Speech Bubble: Rectangle with Corners Rounded 6">
+            <a:extLst>
+              <a:ext uri="{FF2B5EF4-FFF2-40B4-BE49-F238E27FC236}">
+                <a16:creationId xmlns:a16="http://schemas.microsoft.com/office/drawing/2014/main" id="{3A633D3C-66D6-4484-9FDF-0FF6FB4DD6D6}"/>
+              </a:ext>
+            </a:extLst>
+          </p:cNvPr>
+          <p:cNvSpPr/>
+          <p:nvPr/>
+        </p:nvSpPr>
+        <p:spPr>
+          <a:xfrm>
+            <a:off x="965522" y="1577975"/>
+            <a:ext cx="4686300" cy="885825"/>
+          </a:xfrm>
+          <a:prstGeom prst="wedgeRoundRectCallout">
+            <a:avLst>
+              <a:gd name="adj1" fmla="val 56544"/>
+              <a:gd name="adj2" fmla="val 26976"/>
+              <a:gd name="adj3" fmla="val 16667"/>
+            </a:avLst>
+          </a:prstGeom>
+          <a:solidFill>
+            <a:schemeClr val="accent2">
+              <a:lumMod val="20000"/>
+              <a:lumOff val="80000"/>
+            </a:schemeClr>
+          </a:solidFill>
+          <a:ln>
+            <a:solidFill>
+              <a:srgbClr val="0070C0"/>
+            </a:solidFill>
+          </a:ln>
+        </p:spPr>
+        <p:style>
+          <a:lnRef idx="2">
+            <a:schemeClr val="accent1">
+              <a:shade val="50000"/>
+            </a:schemeClr>
+          </a:lnRef>
+          <a:fillRef idx="1">
+            <a:schemeClr val="accent1"/>
+          </a:fillRef>
+          <a:effectRef idx="0">
+            <a:schemeClr val="accent1"/>
+          </a:effectRef>
+          <a:fontRef idx="minor">
+            <a:schemeClr val="lt1"/>
+          </a:fontRef>
+        </p:style>
+        <p:txBody>
+          <a:bodyPr rtlCol="0" anchor="ctr"/>
+          <a:lstStyle/>
+          <a:p>
+            <a:pPr algn="l"/>
+            <a:r>
+              <a:rPr lang="en-US" sz="2800" dirty="0">
+                <a:solidFill>
+                  <a:schemeClr val="tx1"/>
+                </a:solidFill>
+              </a:rPr>
+              <a:t>Why did you choose this design?</a:t>
+            </a:r>
+          </a:p>
+        </p:txBody>
+      </p:sp>
+    </p:spTree>
+    <p:extLst>
+      <p:ext uri="{BB962C8B-B14F-4D97-AF65-F5344CB8AC3E}">
+        <p14:creationId xmlns:p14="http://schemas.microsoft.com/office/powerpoint/2010/main" val="2004654939"/>
       </p:ext>
     </p:extLst>
   </p:cSld>
@@ -26905,6 +27564,817 @@
     <p:extLst>
       <p:ext uri="{BB962C8B-B14F-4D97-AF65-F5344CB8AC3E}">
         <p14:creationId xmlns:p14="http://schemas.microsoft.com/office/powerpoint/2010/main" val="4189392190"/>
+      </p:ext>
+    </p:extLst>
+  </p:cSld>
+  <p:clrMapOvr>
+    <a:masterClrMapping/>
+  </p:clrMapOvr>
+</p:sld>
+</file>
+
+<file path=ppt/slides/slide30.xml><?xml version="1.0" encoding="utf-8"?>
+<p:sld xmlns:a="http://schemas.openxmlformats.org/drawingml/2006/main" xmlns:r="http://schemas.openxmlformats.org/officeDocument/2006/relationships" xmlns:p="http://schemas.openxmlformats.org/presentationml/2006/main">
+  <p:cSld>
+    <p:spTree>
+      <p:nvGrpSpPr>
+        <p:cNvPr id="1" name=""/>
+        <p:cNvGrpSpPr/>
+        <p:nvPr/>
+      </p:nvGrpSpPr>
+      <p:grpSpPr>
+        <a:xfrm>
+          <a:off x="0" y="0"/>
+          <a:ext cx="0" cy="0"/>
+          <a:chOff x="0" y="0"/>
+          <a:chExt cx="0" cy="0"/>
+        </a:xfrm>
+      </p:grpSpPr>
+      <p:sp>
+        <p:nvSpPr>
+          <p:cNvPr id="5" name="Title 4">
+            <a:extLst>
+              <a:ext uri="{FF2B5EF4-FFF2-40B4-BE49-F238E27FC236}">
+                <a16:creationId xmlns:a16="http://schemas.microsoft.com/office/drawing/2014/main" id="{273410E1-E6C4-4D22-A7F9-8EF1CE45AA03}"/>
+              </a:ext>
+            </a:extLst>
+          </p:cNvPr>
+          <p:cNvSpPr>
+            <a:spLocks noGrp="1"/>
+          </p:cNvSpPr>
+          <p:nvPr>
+            <p:ph type="title"/>
+          </p:nvPr>
+        </p:nvSpPr>
+        <p:spPr/>
+        <p:txBody>
+          <a:bodyPr/>
+          <a:lstStyle/>
+          <a:p>
+            <a:r>
+              <a:rPr lang="en-US" dirty="0"/>
+              <a:t>Discussing your design (2) </a:t>
+            </a:r>
+          </a:p>
+        </p:txBody>
+      </p:sp>
+      <p:sp>
+        <p:nvSpPr>
+          <p:cNvPr id="4" name="Slide Number Placeholder 3">
+            <a:extLst>
+              <a:ext uri="{FF2B5EF4-FFF2-40B4-BE49-F238E27FC236}">
+                <a16:creationId xmlns:a16="http://schemas.microsoft.com/office/drawing/2014/main" id="{8B1878C1-F603-4F39-B859-D8D906202A4A}"/>
+              </a:ext>
+            </a:extLst>
+          </p:cNvPr>
+          <p:cNvSpPr>
+            <a:spLocks noGrp="1"/>
+          </p:cNvSpPr>
+          <p:nvPr>
+            <p:ph type="sldNum" sz="quarter" idx="12"/>
+          </p:nvPr>
+        </p:nvSpPr>
+        <p:spPr/>
+        <p:txBody>
+          <a:bodyPr/>
+          <a:lstStyle/>
+          <a:p>
+            <a:fld id="{20F37917-FD3A-4669-9018-DA04BCDD3D75}" type="slidenum">
+              <a:rPr lang="en-US" smtClean="0"/>
+              <a:t>30</a:t>
+            </a:fld>
+            <a:endParaRPr lang="en-US"/>
+          </a:p>
+        </p:txBody>
+      </p:sp>
+      <p:sp>
+        <p:nvSpPr>
+          <p:cNvPr id="6" name="Speech Bubble: Rectangle with Corners Rounded 5">
+            <a:extLst>
+              <a:ext uri="{FF2B5EF4-FFF2-40B4-BE49-F238E27FC236}">
+                <a16:creationId xmlns:a16="http://schemas.microsoft.com/office/drawing/2014/main" id="{706C334E-0405-4E43-98B3-F783B6DA076D}"/>
+              </a:ext>
+            </a:extLst>
+          </p:cNvPr>
+          <p:cNvSpPr/>
+          <p:nvPr/>
+        </p:nvSpPr>
+        <p:spPr>
+          <a:xfrm>
+            <a:off x="6267450" y="2916820"/>
+            <a:ext cx="4686300" cy="2037145"/>
+          </a:xfrm>
+          <a:prstGeom prst="wedgeRoundRectCallout">
+            <a:avLst>
+              <a:gd name="adj1" fmla="val -56991"/>
+              <a:gd name="adj2" fmla="val 40413"/>
+              <a:gd name="adj3" fmla="val 16667"/>
+            </a:avLst>
+          </a:prstGeom>
+          <a:solidFill>
+            <a:schemeClr val="bg1"/>
+          </a:solidFill>
+          <a:ln>
+            <a:solidFill>
+              <a:srgbClr val="0070C0"/>
+            </a:solidFill>
+          </a:ln>
+        </p:spPr>
+        <p:style>
+          <a:lnRef idx="2">
+            <a:schemeClr val="accent1">
+              <a:shade val="50000"/>
+            </a:schemeClr>
+          </a:lnRef>
+          <a:fillRef idx="1">
+            <a:schemeClr val="accent1"/>
+          </a:fillRef>
+          <a:effectRef idx="0">
+            <a:schemeClr val="accent1"/>
+          </a:effectRef>
+          <a:fontRef idx="minor">
+            <a:schemeClr val="lt1"/>
+          </a:fontRef>
+        </p:style>
+        <p:txBody>
+          <a:bodyPr rtlCol="0" anchor="t"/>
+          <a:lstStyle/>
+          <a:p>
+            <a:pPr algn="l"/>
+            <a:r>
+              <a:rPr lang="en-US" sz="2800" dirty="0">
+                <a:solidFill>
+                  <a:schemeClr val="tx1"/>
+                </a:solidFill>
+              </a:rPr>
+              <a:t>Pat told me that the master clock is a singleton, so they will all be getting the same time.</a:t>
+            </a:r>
+          </a:p>
+        </p:txBody>
+      </p:sp>
+      <p:sp>
+        <p:nvSpPr>
+          <p:cNvPr id="7" name="Speech Bubble: Rectangle with Corners Rounded 6">
+            <a:extLst>
+              <a:ext uri="{FF2B5EF4-FFF2-40B4-BE49-F238E27FC236}">
+                <a16:creationId xmlns:a16="http://schemas.microsoft.com/office/drawing/2014/main" id="{3A633D3C-66D6-4484-9FDF-0FF6FB4DD6D6}"/>
+              </a:ext>
+            </a:extLst>
+          </p:cNvPr>
+          <p:cNvSpPr/>
+          <p:nvPr/>
+        </p:nvSpPr>
+        <p:spPr>
+          <a:xfrm>
+            <a:off x="965522" y="1577975"/>
+            <a:ext cx="4686300" cy="1454592"/>
+          </a:xfrm>
+          <a:prstGeom prst="wedgeRoundRectCallout">
+            <a:avLst>
+              <a:gd name="adj1" fmla="val 57285"/>
+              <a:gd name="adj2" fmla="val 34111"/>
+              <a:gd name="adj3" fmla="val 16667"/>
+            </a:avLst>
+          </a:prstGeom>
+          <a:solidFill>
+            <a:schemeClr val="accent2">
+              <a:lumMod val="20000"/>
+              <a:lumOff val="80000"/>
+            </a:schemeClr>
+          </a:solidFill>
+          <a:ln>
+            <a:solidFill>
+              <a:srgbClr val="0070C0"/>
+            </a:solidFill>
+          </a:ln>
+        </p:spPr>
+        <p:style>
+          <a:lnRef idx="2">
+            <a:schemeClr val="accent1">
+              <a:shade val="50000"/>
+            </a:schemeClr>
+          </a:lnRef>
+          <a:fillRef idx="1">
+            <a:schemeClr val="accent1"/>
+          </a:fillRef>
+          <a:effectRef idx="0">
+            <a:schemeClr val="accent1"/>
+          </a:effectRef>
+          <a:fontRef idx="minor">
+            <a:schemeClr val="lt1"/>
+          </a:fontRef>
+        </p:style>
+        <p:txBody>
+          <a:bodyPr rtlCol="0" anchor="ctr"/>
+          <a:lstStyle/>
+          <a:p>
+            <a:pPr algn="l"/>
+            <a:r>
+              <a:rPr lang="en-US" sz="2800" dirty="0">
+                <a:solidFill>
+                  <a:schemeClr val="tx1"/>
+                </a:solidFill>
+              </a:rPr>
+              <a:t>How do you know that all of your objects will get the right</a:t>
+            </a:r>
+          </a:p>
+          <a:p>
+            <a:pPr algn="l"/>
+            <a:r>
+              <a:rPr lang="en-US" sz="2800" dirty="0">
+                <a:solidFill>
+                  <a:schemeClr val="tx1"/>
+                </a:solidFill>
+              </a:rPr>
+              <a:t>time?</a:t>
+            </a:r>
+          </a:p>
+        </p:txBody>
+      </p:sp>
+    </p:spTree>
+    <p:extLst>
+      <p:ext uri="{BB962C8B-B14F-4D97-AF65-F5344CB8AC3E}">
+        <p14:creationId xmlns:p14="http://schemas.microsoft.com/office/powerpoint/2010/main" val="648572056"/>
+      </p:ext>
+    </p:extLst>
+  </p:cSld>
+  <p:clrMapOvr>
+    <a:masterClrMapping/>
+  </p:clrMapOvr>
+</p:sld>
+</file>
+
+<file path=ppt/slides/slide31.xml><?xml version="1.0" encoding="utf-8"?>
+<p:sld xmlns:a="http://schemas.openxmlformats.org/drawingml/2006/main" xmlns:r="http://schemas.openxmlformats.org/officeDocument/2006/relationships" xmlns:p="http://schemas.openxmlformats.org/presentationml/2006/main">
+  <p:cSld>
+    <p:spTree>
+      <p:nvGrpSpPr>
+        <p:cNvPr id="1" name=""/>
+        <p:cNvGrpSpPr/>
+        <p:nvPr/>
+      </p:nvGrpSpPr>
+      <p:grpSpPr>
+        <a:xfrm>
+          <a:off x="0" y="0"/>
+          <a:ext cx="0" cy="0"/>
+          <a:chOff x="0" y="0"/>
+          <a:chExt cx="0" cy="0"/>
+        </a:xfrm>
+      </p:grpSpPr>
+      <p:sp>
+        <p:nvSpPr>
+          <p:cNvPr id="2" name="Title 1">
+            <a:extLst>
+              <a:ext uri="{FF2B5EF4-FFF2-40B4-BE49-F238E27FC236}">
+                <a16:creationId xmlns:a16="http://schemas.microsoft.com/office/drawing/2014/main" id="{D8842FDD-4B0E-445C-8E75-9A6EE277E4B0}"/>
+              </a:ext>
+            </a:extLst>
+          </p:cNvPr>
+          <p:cNvSpPr>
+            <a:spLocks noGrp="1"/>
+          </p:cNvSpPr>
+          <p:nvPr>
+            <p:ph type="title"/>
+          </p:nvPr>
+        </p:nvSpPr>
+        <p:spPr/>
+        <p:txBody>
+          <a:bodyPr/>
+          <a:lstStyle/>
+          <a:p>
+            <a:r>
+              <a:rPr lang="en-US" dirty="0"/>
+              <a:t>The Discussion (3)</a:t>
+            </a:r>
+          </a:p>
+        </p:txBody>
+      </p:sp>
+      <p:sp>
+        <p:nvSpPr>
+          <p:cNvPr id="3" name="Slide Number Placeholder 2">
+            <a:extLst>
+              <a:ext uri="{FF2B5EF4-FFF2-40B4-BE49-F238E27FC236}">
+                <a16:creationId xmlns:a16="http://schemas.microsoft.com/office/drawing/2014/main" id="{029AE47E-356D-470E-8017-523179E02D5A}"/>
+              </a:ext>
+            </a:extLst>
+          </p:cNvPr>
+          <p:cNvSpPr>
+            <a:spLocks noGrp="1"/>
+          </p:cNvSpPr>
+          <p:nvPr>
+            <p:ph type="sldNum" sz="quarter" idx="12"/>
+          </p:nvPr>
+        </p:nvSpPr>
+        <p:spPr/>
+        <p:txBody>
+          <a:bodyPr/>
+          <a:lstStyle/>
+          <a:p>
+            <a:fld id="{20F37917-FD3A-4669-9018-DA04BCDD3D75}" type="slidenum">
+              <a:rPr lang="en-US" smtClean="0"/>
+              <a:t>31</a:t>
+            </a:fld>
+            <a:endParaRPr lang="en-US"/>
+          </a:p>
+        </p:txBody>
+      </p:sp>
+      <p:sp>
+        <p:nvSpPr>
+          <p:cNvPr id="4" name="Speech Bubble: Rectangle with Corners Rounded 3">
+            <a:extLst>
+              <a:ext uri="{FF2B5EF4-FFF2-40B4-BE49-F238E27FC236}">
+                <a16:creationId xmlns:a16="http://schemas.microsoft.com/office/drawing/2014/main" id="{B5381B48-6537-4C84-A437-E6CC32F22F54}"/>
+              </a:ext>
+            </a:extLst>
+          </p:cNvPr>
+          <p:cNvSpPr/>
+          <p:nvPr/>
+        </p:nvSpPr>
+        <p:spPr>
+          <a:xfrm>
+            <a:off x="6267450" y="2305272"/>
+            <a:ext cx="4686300" cy="3262152"/>
+          </a:xfrm>
+          <a:prstGeom prst="wedgeRoundRectCallout">
+            <a:avLst>
+              <a:gd name="adj1" fmla="val -56991"/>
+              <a:gd name="adj2" fmla="val 40413"/>
+              <a:gd name="adj3" fmla="val 16667"/>
+            </a:avLst>
+          </a:prstGeom>
+          <a:solidFill>
+            <a:schemeClr val="bg1"/>
+          </a:solidFill>
+          <a:ln>
+            <a:solidFill>
+              <a:srgbClr val="0070C0"/>
+            </a:solidFill>
+          </a:ln>
+        </p:spPr>
+        <p:style>
+          <a:lnRef idx="2">
+            <a:schemeClr val="accent1">
+              <a:shade val="50000"/>
+            </a:schemeClr>
+          </a:lnRef>
+          <a:fillRef idx="1">
+            <a:schemeClr val="accent1"/>
+          </a:fillRef>
+          <a:effectRef idx="0">
+            <a:schemeClr val="accent1"/>
+          </a:effectRef>
+          <a:fontRef idx="minor">
+            <a:schemeClr val="lt1"/>
+          </a:fontRef>
+        </p:style>
+        <p:txBody>
+          <a:bodyPr rtlCol="0" anchor="t"/>
+          <a:lstStyle/>
+          <a:p>
+            <a:pPr algn="l"/>
+            <a:r>
+              <a:rPr lang="en-US" sz="2800" dirty="0">
+                <a:solidFill>
+                  <a:schemeClr val="tx1"/>
+                </a:solidFill>
+              </a:rPr>
+              <a:t>That's something that happens in the module that exports the clock factory.  Pat is building that module.  They say it's not hard, but they  will show me how to do it in a couple of weeks.</a:t>
+            </a:r>
+          </a:p>
+        </p:txBody>
+      </p:sp>
+      <p:sp>
+        <p:nvSpPr>
+          <p:cNvPr id="5" name="Speech Bubble: Rectangle with Corners Rounded 4">
+            <a:extLst>
+              <a:ext uri="{FF2B5EF4-FFF2-40B4-BE49-F238E27FC236}">
+                <a16:creationId xmlns:a16="http://schemas.microsoft.com/office/drawing/2014/main" id="{D48C6AC9-B316-49B7-9B29-B84342D7D993}"/>
+              </a:ext>
+            </a:extLst>
+          </p:cNvPr>
+          <p:cNvSpPr/>
+          <p:nvPr/>
+        </p:nvSpPr>
+        <p:spPr>
+          <a:xfrm>
+            <a:off x="965522" y="1577975"/>
+            <a:ext cx="4686300" cy="1454592"/>
+          </a:xfrm>
+          <a:prstGeom prst="wedgeRoundRectCallout">
+            <a:avLst>
+              <a:gd name="adj1" fmla="val 57285"/>
+              <a:gd name="adj2" fmla="val 34111"/>
+              <a:gd name="adj3" fmla="val 16667"/>
+            </a:avLst>
+          </a:prstGeom>
+          <a:solidFill>
+            <a:schemeClr val="accent2">
+              <a:lumMod val="20000"/>
+              <a:lumOff val="80000"/>
+            </a:schemeClr>
+          </a:solidFill>
+          <a:ln>
+            <a:solidFill>
+              <a:srgbClr val="0070C0"/>
+            </a:solidFill>
+          </a:ln>
+        </p:spPr>
+        <p:style>
+          <a:lnRef idx="2">
+            <a:schemeClr val="accent1">
+              <a:shade val="50000"/>
+            </a:schemeClr>
+          </a:lnRef>
+          <a:fillRef idx="1">
+            <a:schemeClr val="accent1"/>
+          </a:fillRef>
+          <a:effectRef idx="0">
+            <a:schemeClr val="accent1"/>
+          </a:effectRef>
+          <a:fontRef idx="minor">
+            <a:schemeClr val="lt1"/>
+          </a:fontRef>
+        </p:style>
+        <p:txBody>
+          <a:bodyPr rtlCol="0" anchor="ctr"/>
+          <a:lstStyle/>
+          <a:p>
+            <a:pPr algn="l"/>
+            <a:r>
+              <a:rPr lang="en-US" sz="2800" dirty="0">
+                <a:solidFill>
+                  <a:schemeClr val="tx1"/>
+                </a:solidFill>
+              </a:rPr>
+              <a:t>Who is responsible for keeping the master clock up to date?</a:t>
+            </a:r>
+          </a:p>
+        </p:txBody>
+      </p:sp>
+    </p:spTree>
+    <p:extLst>
+      <p:ext uri="{BB962C8B-B14F-4D97-AF65-F5344CB8AC3E}">
+        <p14:creationId xmlns:p14="http://schemas.microsoft.com/office/powerpoint/2010/main" val="934883779"/>
+      </p:ext>
+    </p:extLst>
+  </p:cSld>
+  <p:clrMapOvr>
+    <a:masterClrMapping/>
+  </p:clrMapOvr>
+</p:sld>
+</file>
+
+<file path=ppt/slides/slide32.xml><?xml version="1.0" encoding="utf-8"?>
+<p:sld xmlns:a="http://schemas.openxmlformats.org/drawingml/2006/main" xmlns:r="http://schemas.openxmlformats.org/officeDocument/2006/relationships" xmlns:p="http://schemas.openxmlformats.org/presentationml/2006/main">
+  <p:cSld>
+    <p:spTree>
+      <p:nvGrpSpPr>
+        <p:cNvPr id="1" name=""/>
+        <p:cNvGrpSpPr/>
+        <p:nvPr/>
+      </p:nvGrpSpPr>
+      <p:grpSpPr>
+        <a:xfrm>
+          <a:off x="0" y="0"/>
+          <a:ext cx="0" cy="0"/>
+          <a:chOff x="0" y="0"/>
+          <a:chExt cx="0" cy="0"/>
+        </a:xfrm>
+      </p:grpSpPr>
+      <p:sp>
+        <p:nvSpPr>
+          <p:cNvPr id="2" name="Title 1">
+            <a:extLst>
+              <a:ext uri="{FF2B5EF4-FFF2-40B4-BE49-F238E27FC236}">
+                <a16:creationId xmlns:a16="http://schemas.microsoft.com/office/drawing/2014/main" id="{D8842FDD-4B0E-445C-8E75-9A6EE277E4B0}"/>
+              </a:ext>
+            </a:extLst>
+          </p:cNvPr>
+          <p:cNvSpPr>
+            <a:spLocks noGrp="1"/>
+          </p:cNvSpPr>
+          <p:nvPr>
+            <p:ph type="title"/>
+          </p:nvPr>
+        </p:nvSpPr>
+        <p:spPr/>
+        <p:txBody>
+          <a:bodyPr/>
+          <a:lstStyle/>
+          <a:p>
+            <a:r>
+              <a:rPr lang="en-US" dirty="0"/>
+              <a:t>The Discussion (4)</a:t>
+            </a:r>
+          </a:p>
+        </p:txBody>
+      </p:sp>
+      <p:sp>
+        <p:nvSpPr>
+          <p:cNvPr id="3" name="Slide Number Placeholder 2">
+            <a:extLst>
+              <a:ext uri="{FF2B5EF4-FFF2-40B4-BE49-F238E27FC236}">
+                <a16:creationId xmlns:a16="http://schemas.microsoft.com/office/drawing/2014/main" id="{029AE47E-356D-470E-8017-523179E02D5A}"/>
+              </a:ext>
+            </a:extLst>
+          </p:cNvPr>
+          <p:cNvSpPr>
+            <a:spLocks noGrp="1"/>
+          </p:cNvSpPr>
+          <p:nvPr>
+            <p:ph type="sldNum" sz="quarter" idx="12"/>
+          </p:nvPr>
+        </p:nvSpPr>
+        <p:spPr/>
+        <p:txBody>
+          <a:bodyPr/>
+          <a:lstStyle/>
+          <a:p>
+            <a:fld id="{20F37917-FD3A-4669-9018-DA04BCDD3D75}" type="slidenum">
+              <a:rPr lang="en-US" smtClean="0"/>
+              <a:t>32</a:t>
+            </a:fld>
+            <a:endParaRPr lang="en-US"/>
+          </a:p>
+        </p:txBody>
+      </p:sp>
+      <p:sp>
+        <p:nvSpPr>
+          <p:cNvPr id="4" name="Speech Bubble: Rectangle with Corners Rounded 3">
+            <a:extLst>
+              <a:ext uri="{FF2B5EF4-FFF2-40B4-BE49-F238E27FC236}">
+                <a16:creationId xmlns:a16="http://schemas.microsoft.com/office/drawing/2014/main" id="{B5381B48-6537-4C84-A437-E6CC32F22F54}"/>
+              </a:ext>
+            </a:extLst>
+          </p:cNvPr>
+          <p:cNvSpPr/>
+          <p:nvPr/>
+        </p:nvSpPr>
+        <p:spPr>
+          <a:xfrm>
+            <a:off x="6267450" y="2305272"/>
+            <a:ext cx="4686300" cy="3262152"/>
+          </a:xfrm>
+          <a:prstGeom prst="wedgeRoundRectCallout">
+            <a:avLst>
+              <a:gd name="adj1" fmla="val -56991"/>
+              <a:gd name="adj2" fmla="val 40413"/>
+              <a:gd name="adj3" fmla="val 16667"/>
+            </a:avLst>
+          </a:prstGeom>
+          <a:solidFill>
+            <a:schemeClr val="bg1"/>
+          </a:solidFill>
+          <a:ln>
+            <a:solidFill>
+              <a:srgbClr val="0070C0"/>
+            </a:solidFill>
+          </a:ln>
+        </p:spPr>
+        <p:style>
+          <a:lnRef idx="2">
+            <a:schemeClr val="accent1">
+              <a:shade val="50000"/>
+            </a:schemeClr>
+          </a:lnRef>
+          <a:fillRef idx="1">
+            <a:schemeClr val="accent1"/>
+          </a:fillRef>
+          <a:effectRef idx="0">
+            <a:schemeClr val="accent1"/>
+          </a:effectRef>
+          <a:fontRef idx="minor">
+            <a:schemeClr val="lt1"/>
+          </a:fontRef>
+        </p:style>
+        <p:txBody>
+          <a:bodyPr rtlCol="0" anchor="t"/>
+          <a:lstStyle/>
+          <a:p>
+            <a:pPr algn="l"/>
+            <a:r>
+              <a:rPr lang="en-US" sz="2800" dirty="0">
+                <a:solidFill>
+                  <a:schemeClr val="tx1"/>
+                </a:solidFill>
+              </a:rPr>
+              <a:t>The clock factory exports a class with an interface that only allows me to register.  The interface doesn’t provide me with a method for ticking the clock.</a:t>
+            </a:r>
+          </a:p>
+        </p:txBody>
+      </p:sp>
+      <p:sp>
+        <p:nvSpPr>
+          <p:cNvPr id="5" name="Speech Bubble: Rectangle with Corners Rounded 4">
+            <a:extLst>
+              <a:ext uri="{FF2B5EF4-FFF2-40B4-BE49-F238E27FC236}">
+                <a16:creationId xmlns:a16="http://schemas.microsoft.com/office/drawing/2014/main" id="{D48C6AC9-B316-49B7-9B29-B84342D7D993}"/>
+              </a:ext>
+            </a:extLst>
+          </p:cNvPr>
+          <p:cNvSpPr/>
+          <p:nvPr/>
+        </p:nvSpPr>
+        <p:spPr>
+          <a:xfrm>
+            <a:off x="965522" y="1577975"/>
+            <a:ext cx="4686300" cy="1454592"/>
+          </a:xfrm>
+          <a:prstGeom prst="wedgeRoundRectCallout">
+            <a:avLst>
+              <a:gd name="adj1" fmla="val 57285"/>
+              <a:gd name="adj2" fmla="val 34111"/>
+              <a:gd name="adj3" fmla="val 16667"/>
+            </a:avLst>
+          </a:prstGeom>
+          <a:solidFill>
+            <a:schemeClr val="accent2">
+              <a:lumMod val="20000"/>
+              <a:lumOff val="80000"/>
+            </a:schemeClr>
+          </a:solidFill>
+          <a:ln>
+            <a:solidFill>
+              <a:srgbClr val="0070C0"/>
+            </a:solidFill>
+          </a:ln>
+        </p:spPr>
+        <p:style>
+          <a:lnRef idx="2">
+            <a:schemeClr val="accent1">
+              <a:shade val="50000"/>
+            </a:schemeClr>
+          </a:lnRef>
+          <a:fillRef idx="1">
+            <a:schemeClr val="accent1"/>
+          </a:fillRef>
+          <a:effectRef idx="0">
+            <a:schemeClr val="accent1"/>
+          </a:effectRef>
+          <a:fontRef idx="minor">
+            <a:schemeClr val="lt1"/>
+          </a:fontRef>
+        </p:style>
+        <p:txBody>
+          <a:bodyPr rtlCol="0" anchor="ctr"/>
+          <a:lstStyle/>
+          <a:p>
+            <a:pPr algn="l"/>
+            <a:r>
+              <a:rPr lang="en-US" sz="2800" dirty="0">
+                <a:solidFill>
+                  <a:schemeClr val="tx1"/>
+                </a:solidFill>
+              </a:rPr>
+              <a:t>What's to prevent you from ticking the master clock</a:t>
+            </a:r>
+          </a:p>
+          <a:p>
+            <a:pPr algn="l"/>
+            <a:r>
+              <a:rPr lang="en-US" sz="2800" dirty="0">
+                <a:solidFill>
+                  <a:schemeClr val="tx1"/>
+                </a:solidFill>
+              </a:rPr>
+              <a:t>yourself?</a:t>
+            </a:r>
+          </a:p>
+        </p:txBody>
+      </p:sp>
+    </p:spTree>
+    <p:extLst>
+      <p:ext uri="{BB962C8B-B14F-4D97-AF65-F5344CB8AC3E}">
+        <p14:creationId xmlns:p14="http://schemas.microsoft.com/office/powerpoint/2010/main" val="2186411904"/>
+      </p:ext>
+    </p:extLst>
+  </p:cSld>
+  <p:clrMapOvr>
+    <a:masterClrMapping/>
+  </p:clrMapOvr>
+</p:sld>
+</file>
+
+<file path=ppt/slides/slide33.xml><?xml version="1.0" encoding="utf-8"?>
+<p:sld xmlns:a="http://schemas.openxmlformats.org/drawingml/2006/main" xmlns:r="http://schemas.openxmlformats.org/officeDocument/2006/relationships" xmlns:p="http://schemas.openxmlformats.org/presentationml/2006/main">
+  <p:cSld>
+    <p:spTree>
+      <p:nvGrpSpPr>
+        <p:cNvPr id="1" name=""/>
+        <p:cNvGrpSpPr/>
+        <p:nvPr/>
+      </p:nvGrpSpPr>
+      <p:grpSpPr>
+        <a:xfrm>
+          <a:off x="0" y="0"/>
+          <a:ext cx="0" cy="0"/>
+          <a:chOff x="0" y="0"/>
+          <a:chExt cx="0" cy="0"/>
+        </a:xfrm>
+      </p:grpSpPr>
+      <p:sp>
+        <p:nvSpPr>
+          <p:cNvPr id="2" name="Title 1">
+            <a:extLst>
+              <a:ext uri="{FF2B5EF4-FFF2-40B4-BE49-F238E27FC236}">
+                <a16:creationId xmlns:a16="http://schemas.microsoft.com/office/drawing/2014/main" id="{E743D407-5B53-49A7-9907-E801EA7FFD8E}"/>
+              </a:ext>
+            </a:extLst>
+          </p:cNvPr>
+          <p:cNvSpPr>
+            <a:spLocks noGrp="1"/>
+          </p:cNvSpPr>
+          <p:nvPr>
+            <p:ph type="title"/>
+          </p:nvPr>
+        </p:nvSpPr>
+        <p:spPr/>
+        <p:txBody>
+          <a:bodyPr/>
+          <a:lstStyle/>
+          <a:p>
+            <a:r>
+              <a:rPr lang="en-US" dirty="0"/>
+              <a:t>Learning Goals for this Lesson</a:t>
+            </a:r>
+          </a:p>
+        </p:txBody>
+      </p:sp>
+      <p:sp>
+        <p:nvSpPr>
+          <p:cNvPr id="3" name="Content Placeholder 2">
+            <a:extLst>
+              <a:ext uri="{FF2B5EF4-FFF2-40B4-BE49-F238E27FC236}">
+                <a16:creationId xmlns:a16="http://schemas.microsoft.com/office/drawing/2014/main" id="{AC300E2B-BFD0-4090-AFC5-FE82683F997F}"/>
+              </a:ext>
+            </a:extLst>
+          </p:cNvPr>
+          <p:cNvSpPr>
+            <a:spLocks noGrp="1"/>
+          </p:cNvSpPr>
+          <p:nvPr>
+            <p:ph idx="1"/>
+          </p:nvPr>
+        </p:nvSpPr>
+        <p:spPr/>
+        <p:txBody>
+          <a:bodyPr/>
+          <a:lstStyle/>
+          <a:p>
+            <a:r>
+              <a:rPr lang="en-US" dirty="0"/>
+              <a:t>At this point, you should be able to</a:t>
+            </a:r>
+          </a:p>
+          <a:p>
+            <a:pPr lvl="1"/>
+            <a:r>
+              <a:rPr lang="en-US" dirty="0"/>
+              <a:t>Give 4 examples of interaction patterns and describe their distinguishing characteristics</a:t>
+            </a:r>
+          </a:p>
+          <a:p>
+            <a:pPr lvl="1"/>
+            <a:r>
+              <a:rPr lang="en-US" dirty="0"/>
+              <a:t>Draw a picture or give an example to illustrate each one</a:t>
+            </a:r>
+          </a:p>
+        </p:txBody>
+      </p:sp>
+      <p:sp>
+        <p:nvSpPr>
+          <p:cNvPr id="4" name="Slide Number Placeholder 3">
+            <a:extLst>
+              <a:ext uri="{FF2B5EF4-FFF2-40B4-BE49-F238E27FC236}">
+                <a16:creationId xmlns:a16="http://schemas.microsoft.com/office/drawing/2014/main" id="{B7BF3F82-6F96-41E0-9C15-23CE00076176}"/>
+              </a:ext>
+            </a:extLst>
+          </p:cNvPr>
+          <p:cNvSpPr>
+            <a:spLocks noGrp="1"/>
+          </p:cNvSpPr>
+          <p:nvPr>
+            <p:ph type="sldNum" sz="quarter" idx="12"/>
+          </p:nvPr>
+        </p:nvSpPr>
+        <p:spPr/>
+        <p:txBody>
+          <a:bodyPr/>
+          <a:lstStyle/>
+          <a:p>
+            <a:fld id="{20F37917-FD3A-4669-9018-DA04BCDD3D75}" type="slidenum">
+              <a:rPr lang="en-US" smtClean="0"/>
+              <a:t>33</a:t>
+            </a:fld>
+            <a:endParaRPr lang="en-US"/>
+          </a:p>
+        </p:txBody>
+      </p:sp>
+    </p:spTree>
+    <p:extLst>
+      <p:ext uri="{BB962C8B-B14F-4D97-AF65-F5344CB8AC3E}">
+        <p14:creationId xmlns:p14="http://schemas.microsoft.com/office/powerpoint/2010/main" val="3988182231"/>
       </p:ext>
     </p:extLst>
   </p:cSld>

</xml_diff>